<commit_message>
shuffling panel tags on fig 2
</commit_message>
<xml_diff>
--- a/Figures/figure_02.pptx
+++ b/Figures/figure_02.pptx
@@ -110,14 +110,6 @@
     </p:ext>
   </p:extLst>
 </p:presentation>
-</file>
-
-<file path=ppt/revisionInfo.xml><?xml version="1.0" encoding="utf-8"?>
-<p1510:revInfo xmlns:a="http://schemas.openxmlformats.org/drawingml/2006/main" xmlns:r="http://schemas.openxmlformats.org/officeDocument/2006/relationships" xmlns:p1510="http://schemas.microsoft.com/office/powerpoint/2015/10/main">
-  <p1510:revLst>
-    <p1510:client id="{2CC45162-3A47-4351-9ABE-4E42CED75E73}" v="6" dt="2025-05-14T16:12:41.488"/>
-  </p1510:revLst>
-</p1510:revInfo>
 </file>
 
 <file path=ppt/changesInfos/changesInfo1.xml><?xml version="1.0" encoding="utf-8"?>
@@ -255,14 +247,6 @@
             <ac:spMk id="57" creationId="{3FA3D6C4-3C3B-CDF4-CF97-2E3510EB4F94}"/>
           </ac:spMkLst>
         </pc:spChg>
-        <pc:grpChg chg="add del ord">
-          <ac:chgData name="Gilbert, Neil" userId="37be9f5c-8f28-415b-96d6-624acf93bb3f" providerId="ADAL" clId="{2CC45162-3A47-4351-9ABE-4E42CED75E73}" dt="2025-05-14T16:02:37.399" v="23" actId="478"/>
-          <ac:grpSpMkLst>
-            <pc:docMk/>
-            <pc:sldMk cId="2243382854" sldId="256"/>
-            <ac:grpSpMk id="33" creationId="{E2B48345-8CBC-3382-608F-9A0018F85024}"/>
-          </ac:grpSpMkLst>
-        </pc:grpChg>
         <pc:picChg chg="add mod ord">
           <ac:chgData name="Gilbert, Neil" userId="37be9f5c-8f28-415b-96d6-624acf93bb3f" providerId="ADAL" clId="{2CC45162-3A47-4351-9ABE-4E42CED75E73}" dt="2025-05-14T16:01:51.217" v="10" actId="167"/>
           <ac:picMkLst>
@@ -279,14 +263,6 @@
             <ac:picMk id="5" creationId="{9288EF1D-2281-2A96-E68D-FF06E2D2A292}"/>
           </ac:picMkLst>
         </pc:picChg>
-        <pc:picChg chg="add del mod">
-          <ac:chgData name="Gilbert, Neil" userId="37be9f5c-8f28-415b-96d6-624acf93bb3f" providerId="ADAL" clId="{2CC45162-3A47-4351-9ABE-4E42CED75E73}" dt="2025-05-14T16:12:35.105" v="55" actId="478"/>
-          <ac:picMkLst>
-            <pc:docMk/>
-            <pc:sldMk cId="2243382854" sldId="256"/>
-            <ac:picMk id="7" creationId="{06931D3A-DEC0-06FC-3C96-204B32FFC4BE}"/>
-          </ac:picMkLst>
-        </pc:picChg>
         <pc:picChg chg="add mod ord">
           <ac:chgData name="Gilbert, Neil" userId="37be9f5c-8f28-415b-96d6-624acf93bb3f" providerId="ADAL" clId="{2CC45162-3A47-4351-9ABE-4E42CED75E73}" dt="2025-05-14T16:15:07.899" v="64" actId="167"/>
           <ac:picMkLst>
@@ -295,30 +271,38 @@
             <ac:picMk id="9" creationId="{82C931A3-3140-768A-3FB7-F945757EAF47}"/>
           </ac:picMkLst>
         </pc:picChg>
-        <pc:picChg chg="add del">
-          <ac:chgData name="Gilbert, Neil" userId="37be9f5c-8f28-415b-96d6-624acf93bb3f" providerId="ADAL" clId="{2CC45162-3A47-4351-9ABE-4E42CED75E73}" dt="2025-05-14T16:04:49.441" v="50" actId="478"/>
-          <ac:picMkLst>
+      </pc:sldChg>
+    </pc:docChg>
+  </pc:docChgLst>
+  <pc:docChgLst>
+    <pc:chgData name="Gilbert, Neil" userId="37be9f5c-8f28-415b-96d6-624acf93bb3f" providerId="ADAL" clId="{ED1AC38B-4E2C-43B3-AD32-08786CF2C0A8}"/>
+    <pc:docChg chg="modSld">
+      <pc:chgData name="Gilbert, Neil" userId="37be9f5c-8f28-415b-96d6-624acf93bb3f" providerId="ADAL" clId="{ED1AC38B-4E2C-43B3-AD32-08786CF2C0A8}" dt="2025-07-03T14:55:10.163" v="3" actId="20577"/>
+      <pc:docMkLst>
+        <pc:docMk/>
+      </pc:docMkLst>
+      <pc:sldChg chg="modSp mod">
+        <pc:chgData name="Gilbert, Neil" userId="37be9f5c-8f28-415b-96d6-624acf93bb3f" providerId="ADAL" clId="{ED1AC38B-4E2C-43B3-AD32-08786CF2C0A8}" dt="2025-07-03T14:55:10.163" v="3" actId="20577"/>
+        <pc:sldMkLst>
+          <pc:docMk/>
+          <pc:sldMk cId="2243382854" sldId="256"/>
+        </pc:sldMkLst>
+        <pc:spChg chg="mod">
+          <ac:chgData name="Gilbert, Neil" userId="37be9f5c-8f28-415b-96d6-624acf93bb3f" providerId="ADAL" clId="{ED1AC38B-4E2C-43B3-AD32-08786CF2C0A8}" dt="2025-07-03T14:55:10.163" v="3" actId="20577"/>
+          <ac:spMkLst>
             <pc:docMk/>
             <pc:sldMk cId="2243382854" sldId="256"/>
-            <ac:picMk id="34" creationId="{168FB17A-635A-BF94-7CEF-8E660E8476BA}"/>
-          </ac:picMkLst>
-        </pc:picChg>
-        <pc:picChg chg="del">
-          <ac:chgData name="Gilbert, Neil" userId="37be9f5c-8f28-415b-96d6-624acf93bb3f" providerId="ADAL" clId="{2CC45162-3A47-4351-9ABE-4E42CED75E73}" dt="2025-05-14T16:01:24.857" v="1" actId="478"/>
-          <ac:picMkLst>
+            <ac:spMk id="37" creationId="{89829C2E-F252-FACB-478B-79C500CA8E29}"/>
+          </ac:spMkLst>
+        </pc:spChg>
+        <pc:spChg chg="mod">
+          <ac:chgData name="Gilbert, Neil" userId="37be9f5c-8f28-415b-96d6-624acf93bb3f" providerId="ADAL" clId="{ED1AC38B-4E2C-43B3-AD32-08786CF2C0A8}" dt="2025-07-03T14:55:06.805" v="1" actId="20577"/>
+          <ac:spMkLst>
             <pc:docMk/>
             <pc:sldMk cId="2243382854" sldId="256"/>
-            <ac:picMk id="35" creationId="{EA6BE4AB-D2D7-A0D8-477F-C0619A15FB9F}"/>
-          </ac:picMkLst>
-        </pc:picChg>
-        <pc:picChg chg="del">
-          <ac:chgData name="Gilbert, Neil" userId="37be9f5c-8f28-415b-96d6-624acf93bb3f" providerId="ADAL" clId="{2CC45162-3A47-4351-9ABE-4E42CED75E73}" dt="2025-05-14T16:02:47.681" v="25" actId="478"/>
-          <ac:picMkLst>
-            <pc:docMk/>
-            <pc:sldMk cId="2243382854" sldId="256"/>
-            <ac:picMk id="39" creationId="{7C749AC2-05AA-C165-4E97-C4DA5D61263D}"/>
-          </ac:picMkLst>
-        </pc:picChg>
+            <ac:spMk id="38" creationId="{2CB37327-1B8A-E17D-5616-B0F08C13AB41}"/>
+          </ac:spMkLst>
+        </pc:spChg>
       </pc:sldChg>
     </pc:docChg>
   </pc:docChgLst>
@@ -456,7 +440,7 @@
           <a:p>
             <a:fld id="{4BEA219F-BCCD-41CE-BCC5-5971CBA772A2}" type="datetimeFigureOut">
               <a:rPr lang="en-US" smtClean="0"/>
-              <a:t>5/14/2025</a:t>
+              <a:t>7/3/2025</a:t>
             </a:fld>
             <a:endParaRPr lang="en-US"/>
           </a:p>
@@ -626,7 +610,7 @@
           <a:p>
             <a:fld id="{4BEA219F-BCCD-41CE-BCC5-5971CBA772A2}" type="datetimeFigureOut">
               <a:rPr lang="en-US" smtClean="0"/>
-              <a:t>5/14/2025</a:t>
+              <a:t>7/3/2025</a:t>
             </a:fld>
             <a:endParaRPr lang="en-US"/>
           </a:p>
@@ -806,7 +790,7 @@
           <a:p>
             <a:fld id="{4BEA219F-BCCD-41CE-BCC5-5971CBA772A2}" type="datetimeFigureOut">
               <a:rPr lang="en-US" smtClean="0"/>
-              <a:t>5/14/2025</a:t>
+              <a:t>7/3/2025</a:t>
             </a:fld>
             <a:endParaRPr lang="en-US"/>
           </a:p>
@@ -976,7 +960,7 @@
           <a:p>
             <a:fld id="{4BEA219F-BCCD-41CE-BCC5-5971CBA772A2}" type="datetimeFigureOut">
               <a:rPr lang="en-US" smtClean="0"/>
-              <a:t>5/14/2025</a:t>
+              <a:t>7/3/2025</a:t>
             </a:fld>
             <a:endParaRPr lang="en-US"/>
           </a:p>
@@ -1222,7 +1206,7 @@
           <a:p>
             <a:fld id="{4BEA219F-BCCD-41CE-BCC5-5971CBA772A2}" type="datetimeFigureOut">
               <a:rPr lang="en-US" smtClean="0"/>
-              <a:t>5/14/2025</a:t>
+              <a:t>7/3/2025</a:t>
             </a:fld>
             <a:endParaRPr lang="en-US"/>
           </a:p>
@@ -1454,7 +1438,7 @@
           <a:p>
             <a:fld id="{4BEA219F-BCCD-41CE-BCC5-5971CBA772A2}" type="datetimeFigureOut">
               <a:rPr lang="en-US" smtClean="0"/>
-              <a:t>5/14/2025</a:t>
+              <a:t>7/3/2025</a:t>
             </a:fld>
             <a:endParaRPr lang="en-US"/>
           </a:p>
@@ -1821,7 +1805,7 @@
           <a:p>
             <a:fld id="{4BEA219F-BCCD-41CE-BCC5-5971CBA772A2}" type="datetimeFigureOut">
               <a:rPr lang="en-US" smtClean="0"/>
-              <a:t>5/14/2025</a:t>
+              <a:t>7/3/2025</a:t>
             </a:fld>
             <a:endParaRPr lang="en-US"/>
           </a:p>
@@ -1939,7 +1923,7 @@
           <a:p>
             <a:fld id="{4BEA219F-BCCD-41CE-BCC5-5971CBA772A2}" type="datetimeFigureOut">
               <a:rPr lang="en-US" smtClean="0"/>
-              <a:t>5/14/2025</a:t>
+              <a:t>7/3/2025</a:t>
             </a:fld>
             <a:endParaRPr lang="en-US"/>
           </a:p>
@@ -2034,7 +2018,7 @@
           <a:p>
             <a:fld id="{4BEA219F-BCCD-41CE-BCC5-5971CBA772A2}" type="datetimeFigureOut">
               <a:rPr lang="en-US" smtClean="0"/>
-              <a:t>5/14/2025</a:t>
+              <a:t>7/3/2025</a:t>
             </a:fld>
             <a:endParaRPr lang="en-US"/>
           </a:p>
@@ -2311,7 +2295,7 @@
           <a:p>
             <a:fld id="{4BEA219F-BCCD-41CE-BCC5-5971CBA772A2}" type="datetimeFigureOut">
               <a:rPr lang="en-US" smtClean="0"/>
-              <a:t>5/14/2025</a:t>
+              <a:t>7/3/2025</a:t>
             </a:fld>
             <a:endParaRPr lang="en-US"/>
           </a:p>
@@ -2568,7 +2552,7 @@
           <a:p>
             <a:fld id="{4BEA219F-BCCD-41CE-BCC5-5971CBA772A2}" type="datetimeFigureOut">
               <a:rPr lang="en-US" smtClean="0"/>
-              <a:t>5/14/2025</a:t>
+              <a:t>7/3/2025</a:t>
             </a:fld>
             <a:endParaRPr lang="en-US"/>
           </a:p>
@@ -2781,7 +2765,7 @@
           <a:p>
             <a:fld id="{4BEA219F-BCCD-41CE-BCC5-5971CBA772A2}" type="datetimeFigureOut">
               <a:rPr lang="en-US" smtClean="0"/>
-              <a:t>5/14/2025</a:t>
+              <a:t>7/3/2025</a:t>
             </a:fld>
             <a:endParaRPr lang="en-US"/>
           </a:p>
@@ -4443,15 +4427,22 @@
           <a:p>
             <a:pPr algn="ctr"/>
             <a:r>
-              <a:rPr lang="en-US" sz="1000" dirty="0">
+              <a:rPr lang="en-US" sz="1000">
                 <a:solidFill>
                   <a:schemeClr val="tx1"/>
                 </a:solidFill>
                 <a:latin typeface="Arial" panose="020B0604020202020204" pitchFamily="34" charset="0"/>
                 <a:cs typeface="Arial" panose="020B0604020202020204" pitchFamily="34" charset="0"/>
               </a:rPr>
-              <a:t>(b)</a:t>
-            </a:r>
+              <a:t>(c)</a:t>
+            </a:r>
+            <a:endParaRPr lang="en-US" sz="1000" dirty="0">
+              <a:solidFill>
+                <a:schemeClr val="tx1"/>
+              </a:solidFill>
+              <a:latin typeface="Arial" panose="020B0604020202020204" pitchFamily="34" charset="0"/>
+              <a:cs typeface="Arial" panose="020B0604020202020204" pitchFamily="34" charset="0"/>
+            </a:endParaRPr>
           </a:p>
         </p:txBody>
       </p:sp>
@@ -4509,7 +4500,7 @@
                 <a:latin typeface="Arial" panose="020B0604020202020204" pitchFamily="34" charset="0"/>
                 <a:cs typeface="Arial" panose="020B0604020202020204" pitchFamily="34" charset="0"/>
               </a:rPr>
-              <a:t>(c)</a:t>
+              <a:t>(b)</a:t>
             </a:r>
           </a:p>
         </p:txBody>

</xml_diff>